<commit_message>
more last minute updates
</commit_message>
<xml_diff>
--- a/final-project/3/Final_Project_3_David_Goldman.pptx
+++ b/final-project/3/Final_Project_3_David_Goldman.pptx
@@ -322,7 +322,7 @@
           <a:p>
             <a:fld id="{48A87A34-81AB-432B-8DAE-1953F412C126}" type="datetimeFigureOut">
               <a:rPr lang="en-US" smtClean="0"/>
-              <a:t>2/20/2017</a:t>
+              <a:t>2/21/2017</a:t>
             </a:fld>
             <a:endParaRPr lang="en-US" dirty="0"/>
           </a:p>
@@ -512,7 +512,7 @@
           <a:p>
             <a:fld id="{48A87A34-81AB-432B-8DAE-1953F412C126}" type="datetimeFigureOut">
               <a:rPr lang="en-US" smtClean="0"/>
-              <a:t>2/20/2017</a:t>
+              <a:t>2/21/2017</a:t>
             </a:fld>
             <a:endParaRPr lang="en-US" dirty="0"/>
           </a:p>
@@ -692,7 +692,7 @@
           <a:p>
             <a:fld id="{48A87A34-81AB-432B-8DAE-1953F412C126}" type="datetimeFigureOut">
               <a:rPr lang="en-US" smtClean="0"/>
-              <a:t>2/20/2017</a:t>
+              <a:t>2/21/2017</a:t>
             </a:fld>
             <a:endParaRPr lang="en-US" dirty="0"/>
           </a:p>
@@ -862,7 +862,7 @@
           <a:p>
             <a:fld id="{48A87A34-81AB-432B-8DAE-1953F412C126}" type="datetimeFigureOut">
               <a:rPr lang="en-US" smtClean="0"/>
-              <a:t>2/20/2017</a:t>
+              <a:t>2/21/2017</a:t>
             </a:fld>
             <a:endParaRPr lang="en-US" dirty="0"/>
           </a:p>
@@ -1118,7 +1118,7 @@
           <a:p>
             <a:fld id="{48A87A34-81AB-432B-8DAE-1953F412C126}" type="datetimeFigureOut">
               <a:rPr lang="en-US" smtClean="0"/>
-              <a:t>2/20/2017</a:t>
+              <a:t>2/21/2017</a:t>
             </a:fld>
             <a:endParaRPr lang="en-US" dirty="0"/>
           </a:p>
@@ -1406,7 +1406,7 @@
           <a:p>
             <a:fld id="{48A87A34-81AB-432B-8DAE-1953F412C126}" type="datetimeFigureOut">
               <a:rPr lang="en-US" smtClean="0"/>
-              <a:t>2/20/2017</a:t>
+              <a:t>2/21/2017</a:t>
             </a:fld>
             <a:endParaRPr lang="en-US" dirty="0"/>
           </a:p>
@@ -1844,7 +1844,7 @@
           <a:p>
             <a:fld id="{48A87A34-81AB-432B-8DAE-1953F412C126}" type="datetimeFigureOut">
               <a:rPr lang="en-US" smtClean="0"/>
-              <a:t>2/20/2017</a:t>
+              <a:t>2/21/2017</a:t>
             </a:fld>
             <a:endParaRPr lang="en-US" dirty="0"/>
           </a:p>
@@ -1962,7 +1962,7 @@
           <a:p>
             <a:fld id="{48A87A34-81AB-432B-8DAE-1953F412C126}" type="datetimeFigureOut">
               <a:rPr lang="en-US" smtClean="0"/>
-              <a:t>2/20/2017</a:t>
+              <a:t>2/21/2017</a:t>
             </a:fld>
             <a:endParaRPr lang="en-US" dirty="0"/>
           </a:p>
@@ -2057,7 +2057,7 @@
           <a:p>
             <a:fld id="{48A87A34-81AB-432B-8DAE-1953F412C126}" type="datetimeFigureOut">
               <a:rPr lang="en-US" smtClean="0"/>
-              <a:t>2/20/2017</a:t>
+              <a:t>2/21/2017</a:t>
             </a:fld>
             <a:endParaRPr lang="en-US" dirty="0"/>
           </a:p>
@@ -2413,7 +2413,7 @@
           <a:p>
             <a:fld id="{48A87A34-81AB-432B-8DAE-1953F412C126}" type="datetimeFigureOut">
               <a:rPr lang="en-US" smtClean="0"/>
-              <a:t>2/20/2017</a:t>
+              <a:t>2/21/2017</a:t>
             </a:fld>
             <a:endParaRPr lang="en-US" dirty="0"/>
           </a:p>
@@ -2730,7 +2730,7 @@
             <a:fld id="{48A87A34-81AB-432B-8DAE-1953F412C126}" type="datetimeFigureOut">
               <a:rPr lang="en-US" smtClean="0"/>
               <a:pPr/>
-              <a:t>2/20/2017</a:t>
+              <a:t>2/21/2017</a:t>
             </a:fld>
             <a:endParaRPr lang="en-US" dirty="0"/>
           </a:p>
@@ -2964,7 +2964,7 @@
             <a:fld id="{48A87A34-81AB-432B-8DAE-1953F412C126}" type="datetimeFigureOut">
               <a:rPr lang="en-US" smtClean="0"/>
               <a:pPr/>
-              <a:t>2/20/2017</a:t>
+              <a:t>2/21/2017</a:t>
             </a:fld>
             <a:endParaRPr lang="en-US" dirty="0"/>
           </a:p>
@@ -3531,7 +3531,13 @@
           <a:p>
             <a:r>
               <a:rPr lang="en-US" sz="2000" b="1" dirty="0"/>
-              <a:t>PTS = -66.31 + 144.07 * </a:t>
+              <a:t>PTS = -66.31</a:t>
+            </a:r>
+          </a:p>
+          <a:p>
+            <a:r>
+              <a:rPr lang="en-US" sz="2000" b="1" dirty="0"/>
+              <a:t>+ 144.07 * </a:t>
             </a:r>
             <a:r>
               <a:rPr lang="en-US" sz="2000" b="1" dirty="0" err="1"/>
@@ -3539,7 +3545,13 @@
             </a:r>
             <a:r>
               <a:rPr lang="en-US" sz="2000" b="1" dirty="0"/>
-              <a:t> + -130.92 * </a:t>
+              <a:t> </a:t>
+            </a:r>
+          </a:p>
+          <a:p>
+            <a:r>
+              <a:rPr lang="en-US" sz="2000" b="1" dirty="0"/>
+              <a:t>+ -130.92 * </a:t>
             </a:r>
             <a:r>
               <a:rPr lang="en-US" sz="2000" b="1" dirty="0" err="1"/>
@@ -3547,7 +3559,13 @@
             </a:r>
             <a:r>
               <a:rPr lang="en-US" sz="2000" b="1" dirty="0"/>
-              <a:t> + 48.65 * </a:t>
+              <a:t> </a:t>
+            </a:r>
+          </a:p>
+          <a:p>
+            <a:r>
+              <a:rPr lang="en-US" sz="2000" b="1" dirty="0"/>
+              <a:t>+ 48.65 * </a:t>
             </a:r>
             <a:r>
               <a:rPr lang="en-US" sz="2000" b="1" dirty="0" err="1"/>
@@ -3555,7 +3573,13 @@
             </a:r>
             <a:r>
               <a:rPr lang="en-US" sz="2000" b="1" dirty="0"/>
-              <a:t> + 31.99 * </a:t>
+              <a:t> </a:t>
+            </a:r>
+          </a:p>
+          <a:p>
+            <a:r>
+              <a:rPr lang="en-US" sz="2000" b="1" dirty="0"/>
+              <a:t>+ 31.99 * </a:t>
             </a:r>
             <a:r>
               <a:rPr lang="en-US" sz="2000" b="1" dirty="0" err="1"/>
@@ -3563,7 +3587,13 @@
             </a:r>
             <a:r>
               <a:rPr lang="en-US" sz="2000" b="1" dirty="0"/>
-              <a:t> + 0.99 * PACE</a:t>
+              <a:t> </a:t>
+            </a:r>
+          </a:p>
+          <a:p>
+            <a:r>
+              <a:rPr lang="en-US" sz="2000" b="1" dirty="0"/>
+              <a:t>+ 0.99 * PACE</a:t>
             </a:r>
           </a:p>
           <a:p>
@@ -3583,13 +3613,15 @@
             </a:r>
             <a:r>
               <a:rPr lang="en-US" sz="2000" b="1" dirty="0"/>
-              <a:t>: 59.5%</a:t>
-            </a:r>
-          </a:p>
-          <a:p>
+              <a:t>: 59.5% </a:t>
+            </a:r>
+            <a:r>
+              <a:rPr lang="en-US" sz="2000" dirty="0"/>
+              <a:t>and</a:t>
+            </a:r>
             <a:r>
               <a:rPr lang="en-US" sz="2000" b="1" dirty="0"/>
-              <a:t>LAC (away) </a:t>
+              <a:t> LAC (away) </a:t>
             </a:r>
             <a:r>
               <a:rPr lang="en-US" sz="2000" b="1" i="1" dirty="0"/>
@@ -4479,7 +4511,15 @@
           <a:p>
             <a:r>
               <a:rPr lang="en-US" sz="2800" dirty="0"/>
-              <a:t>One more metric, “Pace” was also included in the model</a:t>
+              <a:t>One more metric, “</a:t>
+            </a:r>
+            <a:r>
+              <a:rPr lang="en-US" sz="2800" b="1" dirty="0"/>
+              <a:t>Pace</a:t>
+            </a:r>
+            <a:r>
+              <a:rPr lang="en-US" sz="2800" dirty="0"/>
+              <a:t>” was also included in the model</a:t>
             </a:r>
           </a:p>
         </p:txBody>
@@ -4564,7 +4604,7 @@
               <a:buNone/>
             </a:pPr>
             <a:r>
-              <a:rPr lang="en-US" sz="2800" b="1" dirty="0"/>
+              <a:rPr lang="en-US" sz="2800" b="1" u="sng" dirty="0"/>
               <a:t>Train results</a:t>
             </a:r>
           </a:p>
@@ -4584,7 +4624,7 @@
               <a:buNone/>
             </a:pPr>
             <a:r>
-              <a:rPr lang="en-US" sz="2800" b="1" dirty="0"/>
+              <a:rPr lang="en-US" sz="2800" b="1" u="sng" dirty="0"/>
               <a:t>Coefficients</a:t>
             </a:r>
           </a:p>
@@ -4647,7 +4687,23 @@
             <a:pPr lvl="1"/>
             <a:r>
               <a:rPr lang="en-US" sz="2800" b="1" dirty="0"/>
-              <a:t>PACE = 0.99 </a:t>
+              <a:t>PACE </a:t>
+            </a:r>
+            <a:r>
+              <a:rPr lang="en-US" sz="2800" dirty="0"/>
+              <a:t>=</a:t>
+            </a:r>
+            <a:r>
+              <a:rPr lang="en-US" sz="2800" b="1" dirty="0"/>
+              <a:t> </a:t>
+            </a:r>
+            <a:r>
+              <a:rPr lang="en-US" sz="2800" dirty="0"/>
+              <a:t>0.99</a:t>
+            </a:r>
+            <a:r>
+              <a:rPr lang="en-US" sz="2800" b="1" dirty="0"/>
+              <a:t> </a:t>
             </a:r>
             <a:r>
               <a:rPr lang="en-US" sz="2800" dirty="0"/>
@@ -4705,7 +4761,7 @@
           <a:p>
             <a:r>
               <a:rPr lang="en-US" dirty="0"/>
-              <a:t>Now that we have our betas, we need to also forecast x-values to obtain or y-value (PTS)</a:t>
+              <a:t>Now that we have the betas, we need to also forecast x-values to obtain the y-value (PTS)</a:t>
             </a:r>
           </a:p>
         </p:txBody>

</xml_diff>